<commit_message>
More work, intro, related work, results plots
</commit_message>
<xml_diff>
--- a/pics/Drawings.pptx
+++ b/pics/Drawings.pptx
@@ -5,17 +5,18 @@
     <p:sldMasterId id="2147483648" r:id="rId1"/>
   </p:sldMasterIdLst>
   <p:notesMasterIdLst>
-    <p:notesMasterId r:id="rId10"/>
+    <p:notesMasterId r:id="rId11"/>
   </p:notesMasterIdLst>
   <p:sldIdLst>
     <p:sldId id="256" r:id="rId2"/>
     <p:sldId id="263" r:id="rId3"/>
-    <p:sldId id="264" r:id="rId4"/>
-    <p:sldId id="257" r:id="rId5"/>
-    <p:sldId id="260" r:id="rId6"/>
-    <p:sldId id="261" r:id="rId7"/>
-    <p:sldId id="262" r:id="rId8"/>
-    <p:sldId id="259" r:id="rId9"/>
+    <p:sldId id="265" r:id="rId4"/>
+    <p:sldId id="264" r:id="rId5"/>
+    <p:sldId id="257" r:id="rId6"/>
+    <p:sldId id="260" r:id="rId7"/>
+    <p:sldId id="261" r:id="rId8"/>
+    <p:sldId id="262" r:id="rId9"/>
+    <p:sldId id="259" r:id="rId10"/>
   </p:sldIdLst>
   <p:sldSz cx="9144000" cy="6858000" type="screen4x3"/>
   <p:notesSz cx="7099300" cy="10234613"/>
@@ -199,7 +200,7 @@
           <a:p>
             <a:fld id="{0539E0CB-C71E-462F-9AC3-272D38B2EC5D}" type="datetimeFigureOut">
               <a:rPr lang="en-GB" smtClean="0"/>
-              <a:t>07/06/2017</a:t>
+              <a:t>08/06/2017</a:t>
             </a:fld>
             <a:endParaRPr lang="en-GB"/>
           </a:p>
@@ -649,7 +650,7 @@
             <a:fld id="{EEC949FB-ACE9-4802-AE94-F5A3E8FED8FE}" type="datetimeFigureOut">
               <a:rPr lang="en-GB" smtClean="0"/>
               <a:pPr/>
-              <a:t>07/06/2017</a:t>
+              <a:t>08/06/2017</a:t>
             </a:fld>
             <a:endParaRPr lang="en-GB"/>
           </a:p>
@@ -816,7 +817,7 @@
             <a:fld id="{EEC949FB-ACE9-4802-AE94-F5A3E8FED8FE}" type="datetimeFigureOut">
               <a:rPr lang="en-GB" smtClean="0"/>
               <a:pPr/>
-              <a:t>07/06/2017</a:t>
+              <a:t>08/06/2017</a:t>
             </a:fld>
             <a:endParaRPr lang="en-GB"/>
           </a:p>
@@ -993,7 +994,7 @@
             <a:fld id="{EEC949FB-ACE9-4802-AE94-F5A3E8FED8FE}" type="datetimeFigureOut">
               <a:rPr lang="en-GB" smtClean="0"/>
               <a:pPr/>
-              <a:t>07/06/2017</a:t>
+              <a:t>08/06/2017</a:t>
             </a:fld>
             <a:endParaRPr lang="en-GB"/>
           </a:p>
@@ -1160,7 +1161,7 @@
             <a:fld id="{EEC949FB-ACE9-4802-AE94-F5A3E8FED8FE}" type="datetimeFigureOut">
               <a:rPr lang="en-GB" smtClean="0"/>
               <a:pPr/>
-              <a:t>07/06/2017</a:t>
+              <a:t>08/06/2017</a:t>
             </a:fld>
             <a:endParaRPr lang="en-GB"/>
           </a:p>
@@ -1403,7 +1404,7 @@
             <a:fld id="{EEC949FB-ACE9-4802-AE94-F5A3E8FED8FE}" type="datetimeFigureOut">
               <a:rPr lang="en-GB" smtClean="0"/>
               <a:pPr/>
-              <a:t>07/06/2017</a:t>
+              <a:t>08/06/2017</a:t>
             </a:fld>
             <a:endParaRPr lang="en-GB"/>
           </a:p>
@@ -1688,7 +1689,7 @@
             <a:fld id="{EEC949FB-ACE9-4802-AE94-F5A3E8FED8FE}" type="datetimeFigureOut">
               <a:rPr lang="en-GB" smtClean="0"/>
               <a:pPr/>
-              <a:t>07/06/2017</a:t>
+              <a:t>08/06/2017</a:t>
             </a:fld>
             <a:endParaRPr lang="en-GB"/>
           </a:p>
@@ -2107,7 +2108,7 @@
             <a:fld id="{EEC949FB-ACE9-4802-AE94-F5A3E8FED8FE}" type="datetimeFigureOut">
               <a:rPr lang="en-GB" smtClean="0"/>
               <a:pPr/>
-              <a:t>07/06/2017</a:t>
+              <a:t>08/06/2017</a:t>
             </a:fld>
             <a:endParaRPr lang="en-GB"/>
           </a:p>
@@ -2222,7 +2223,7 @@
             <a:fld id="{EEC949FB-ACE9-4802-AE94-F5A3E8FED8FE}" type="datetimeFigureOut">
               <a:rPr lang="en-GB" smtClean="0"/>
               <a:pPr/>
-              <a:t>07/06/2017</a:t>
+              <a:t>08/06/2017</a:t>
             </a:fld>
             <a:endParaRPr lang="en-GB"/>
           </a:p>
@@ -2314,7 +2315,7 @@
             <a:fld id="{EEC949FB-ACE9-4802-AE94-F5A3E8FED8FE}" type="datetimeFigureOut">
               <a:rPr lang="en-GB" smtClean="0"/>
               <a:pPr/>
-              <a:t>07/06/2017</a:t>
+              <a:t>08/06/2017</a:t>
             </a:fld>
             <a:endParaRPr lang="en-GB"/>
           </a:p>
@@ -2588,7 +2589,7 @@
             <a:fld id="{EEC949FB-ACE9-4802-AE94-F5A3E8FED8FE}" type="datetimeFigureOut">
               <a:rPr lang="en-GB" smtClean="0"/>
               <a:pPr/>
-              <a:t>07/06/2017</a:t>
+              <a:t>08/06/2017</a:t>
             </a:fld>
             <a:endParaRPr lang="en-GB"/>
           </a:p>
@@ -2838,7 +2839,7 @@
             <a:fld id="{EEC949FB-ACE9-4802-AE94-F5A3E8FED8FE}" type="datetimeFigureOut">
               <a:rPr lang="en-GB" smtClean="0"/>
               <a:pPr/>
-              <a:t>07/06/2017</a:t>
+              <a:t>08/06/2017</a:t>
             </a:fld>
             <a:endParaRPr lang="en-GB"/>
           </a:p>
@@ -3048,7 +3049,7 @@
             <a:fld id="{EEC949FB-ACE9-4802-AE94-F5A3E8FED8FE}" type="datetimeFigureOut">
               <a:rPr lang="en-GB" smtClean="0"/>
               <a:pPr/>
-              <a:t>07/06/2017</a:t>
+              <a:t>08/06/2017</a:t>
             </a:fld>
             <a:endParaRPr lang="en-GB"/>
           </a:p>
@@ -3482,18 +3483,81 @@
           <a:chExt cx="0" cy="0"/>
         </a:xfrm>
       </p:grpSpPr>
+      <p:sp>
+        <p:nvSpPr>
+          <p:cNvPr id="21" name="Rectangle 20"/>
+          <p:cNvSpPr/>
+          <p:nvPr/>
+        </p:nvSpPr>
+        <p:spPr>
+          <a:xfrm>
+            <a:off x="469057" y="262389"/>
+            <a:ext cx="5098256" cy="246221"/>
+          </a:xfrm>
+          <a:prstGeom prst="rect">
+            <a:avLst/>
+          </a:prstGeom>
+        </p:spPr>
+        <p:txBody>
+          <a:bodyPr wrap="square">
+            <a:spAutoFit/>
+          </a:bodyPr>
+          <a:lstStyle/>
+          <a:p>
+            <a:r>
+              <a:rPr lang="en-US" sz="1000" dirty="0">
+                <a:latin typeface="Times New Roman" panose="02020603050405020304" pitchFamily="18" charset="0"/>
+                <a:cs typeface="Times New Roman" panose="02020603050405020304" pitchFamily="18" charset="0"/>
+              </a:rPr>
+              <a:t>The HPX library provides an implementation of </a:t>
+            </a:r>
+            <a:r>
+              <a:rPr lang="en-US" sz="1000" dirty="0" err="1">
+                <a:latin typeface="Times New Roman" panose="02020603050405020304" pitchFamily="18" charset="0"/>
+                <a:cs typeface="Times New Roman" panose="02020603050405020304" pitchFamily="18" charset="0"/>
+              </a:rPr>
+              <a:t>hpx</a:t>
+            </a:r>
+            <a:r>
+              <a:rPr lang="en-US" sz="1000" dirty="0">
+                <a:latin typeface="Times New Roman" panose="02020603050405020304" pitchFamily="18" charset="0"/>
+                <a:cs typeface="Times New Roman" panose="02020603050405020304" pitchFamily="18" charset="0"/>
+              </a:rPr>
+              <a:t>::async that conforms to the </a:t>
+            </a:r>
+            <a:r>
+              <a:rPr lang="en-US" sz="1000" dirty="0" err="1">
+                <a:latin typeface="Times New Roman" panose="02020603050405020304" pitchFamily="18" charset="0"/>
+                <a:cs typeface="Times New Roman" panose="02020603050405020304" pitchFamily="18" charset="0"/>
+              </a:rPr>
+              <a:t>std</a:t>
+            </a:r>
+            <a:r>
+              <a:rPr lang="en-US" sz="1000" dirty="0">
+                <a:latin typeface="Times New Roman" panose="02020603050405020304" pitchFamily="18" charset="0"/>
+                <a:cs typeface="Times New Roman" panose="02020603050405020304" pitchFamily="18" charset="0"/>
+              </a:rPr>
+              <a:t>::async API </a:t>
+            </a:r>
+            <a:endParaRPr lang="en-GB" sz="1000" dirty="0">
+              <a:latin typeface="Times New Roman" panose="02020603050405020304" pitchFamily="18" charset="0"/>
+              <a:cs typeface="Times New Roman" panose="02020603050405020304" pitchFamily="18" charset="0"/>
+            </a:endParaRPr>
+          </a:p>
+        </p:txBody>
+      </p:sp>
       <p:grpSp>
         <p:nvGrpSpPr>
-          <p:cNvPr id="24" name="Group 23"/>
+          <p:cNvPr id="5" name="Group 4"/>
           <p:cNvGrpSpPr/>
           <p:nvPr/>
         </p:nvGrpSpPr>
         <p:grpSpPr>
           <a:xfrm>
             <a:off x="772319" y="836712"/>
-            <a:ext cx="4463294" cy="648072"/>
+            <a:ext cx="4463294" cy="432048"/>
             <a:chOff x="772319" y="836712"/>
-            <a:chExt cx="4463294" cy="648072"/>
+            <a:chExt cx="4463294" cy="432048"/>
           </a:xfrm>
         </p:grpSpPr>
         <p:sp>
@@ -3505,7 +3569,7 @@
           <p:spPr>
             <a:xfrm>
               <a:off x="772319" y="836712"/>
-              <a:ext cx="963916" cy="648072"/>
+              <a:ext cx="963916" cy="432048"/>
             </a:xfrm>
             <a:prstGeom prst="rect">
               <a:avLst/>
@@ -3563,7 +3627,7 @@
           <p:spPr>
             <a:xfrm>
               <a:off x="2312299" y="836712"/>
-              <a:ext cx="559922" cy="648072"/>
+              <a:ext cx="559922" cy="432048"/>
             </a:xfrm>
             <a:prstGeom prst="rect">
               <a:avLst/>
@@ -3571,13 +3635,13 @@
           </p:spPr>
           <p:style>
             <a:lnRef idx="1">
-              <a:schemeClr val="accent3"/>
+              <a:schemeClr val="accent5"/>
             </a:lnRef>
             <a:fillRef idx="2">
-              <a:schemeClr val="accent3"/>
+              <a:schemeClr val="accent5"/>
             </a:fillRef>
             <a:effectRef idx="1">
-              <a:schemeClr val="accent3"/>
+              <a:schemeClr val="accent5"/>
             </a:effectRef>
             <a:fontRef idx="minor">
               <a:schemeClr val="dk1"/>
@@ -3593,12 +3657,8 @@
                   <a:latin typeface="Times New Roman" panose="02020603050405020304" pitchFamily="18" charset="0"/>
                   <a:cs typeface="Times New Roman" panose="02020603050405020304" pitchFamily="18" charset="0"/>
                 </a:rPr>
-                <a:t>Pointer</a:t>
+                <a:t>RMA</a:t>
               </a:r>
-              <a:endParaRPr lang="en-GB" sz="900" b="1" dirty="0">
-                <a:latin typeface="Times New Roman" panose="02020603050405020304" pitchFamily="18" charset="0"/>
-                <a:cs typeface="Times New Roman" panose="02020603050405020304" pitchFamily="18" charset="0"/>
-              </a:endParaRPr>
             </a:p>
             <a:p>
               <a:pPr algn="ctr"/>
@@ -3625,7 +3685,7 @@
           <p:spPr>
             <a:xfrm>
               <a:off x="1736235" y="836712"/>
-              <a:ext cx="576064" cy="648072"/>
+              <a:ext cx="576064" cy="432048"/>
             </a:xfrm>
             <a:prstGeom prst="rect">
               <a:avLst/>
@@ -3683,7 +3743,7 @@
           <p:spPr>
             <a:xfrm>
               <a:off x="2872221" y="836712"/>
-              <a:ext cx="1411747" cy="648072"/>
+              <a:ext cx="1411747" cy="432048"/>
             </a:xfrm>
             <a:prstGeom prst="rect">
               <a:avLst/>
@@ -3741,7 +3801,7 @@
           <p:spPr>
             <a:xfrm>
               <a:off x="4283968" y="836712"/>
-              <a:ext cx="603040" cy="648072"/>
+              <a:ext cx="603040" cy="432048"/>
             </a:xfrm>
             <a:prstGeom prst="rect">
               <a:avLst/>
@@ -3800,7 +3860,7 @@
           </p:nvCxnSpPr>
           <p:spPr>
             <a:xfrm>
-              <a:off x="4887008" y="1160748"/>
+              <a:off x="4887008" y="1052736"/>
               <a:ext cx="348605" cy="0"/>
             </a:xfrm>
             <a:prstGeom prst="straightConnector1">
@@ -3826,70 +3886,172 @@
             </a:fontRef>
           </p:style>
         </p:cxnSp>
+        <p:cxnSp>
+          <p:nvCxnSpPr>
+            <p:cNvPr id="4" name="Straight Connector 3"/>
+            <p:cNvCxnSpPr/>
+            <p:nvPr/>
+          </p:nvCxnSpPr>
+          <p:spPr>
+            <a:xfrm>
+              <a:off x="971600" y="836712"/>
+              <a:ext cx="0" cy="432048"/>
+            </a:xfrm>
+            <a:prstGeom prst="line">
+              <a:avLst/>
+            </a:prstGeom>
+            <a:ln>
+              <a:prstDash val="sysDot"/>
+            </a:ln>
+          </p:spPr>
+          <p:style>
+            <a:lnRef idx="1">
+              <a:schemeClr val="accent1"/>
+            </a:lnRef>
+            <a:fillRef idx="0">
+              <a:schemeClr val="accent1"/>
+            </a:fillRef>
+            <a:effectRef idx="0">
+              <a:schemeClr val="accent1"/>
+            </a:effectRef>
+            <a:fontRef idx="minor">
+              <a:schemeClr val="tx1"/>
+            </a:fontRef>
+          </p:style>
+        </p:cxnSp>
+        <p:cxnSp>
+          <p:nvCxnSpPr>
+            <p:cNvPr id="12" name="Straight Connector 11"/>
+            <p:cNvCxnSpPr/>
+            <p:nvPr/>
+          </p:nvCxnSpPr>
+          <p:spPr>
+            <a:xfrm>
+              <a:off x="1475656" y="836712"/>
+              <a:ext cx="0" cy="432048"/>
+            </a:xfrm>
+            <a:prstGeom prst="line">
+              <a:avLst/>
+            </a:prstGeom>
+            <a:ln>
+              <a:prstDash val="sysDot"/>
+            </a:ln>
+          </p:spPr>
+          <p:style>
+            <a:lnRef idx="1">
+              <a:schemeClr val="accent1"/>
+            </a:lnRef>
+            <a:fillRef idx="0">
+              <a:schemeClr val="accent1"/>
+            </a:fillRef>
+            <a:effectRef idx="0">
+              <a:schemeClr val="accent1"/>
+            </a:effectRef>
+            <a:fontRef idx="minor">
+              <a:schemeClr val="tx1"/>
+            </a:fontRef>
+          </p:style>
+        </p:cxnSp>
+        <p:cxnSp>
+          <p:nvCxnSpPr>
+            <p:cNvPr id="14" name="Straight Connector 13"/>
+            <p:cNvCxnSpPr/>
+            <p:nvPr/>
+          </p:nvCxnSpPr>
+          <p:spPr>
+            <a:xfrm>
+              <a:off x="2987824" y="836712"/>
+              <a:ext cx="0" cy="432048"/>
+            </a:xfrm>
+            <a:prstGeom prst="line">
+              <a:avLst/>
+            </a:prstGeom>
+            <a:ln>
+              <a:prstDash val="sysDot"/>
+            </a:ln>
+          </p:spPr>
+          <p:style>
+            <a:lnRef idx="1">
+              <a:schemeClr val="accent1"/>
+            </a:lnRef>
+            <a:fillRef idx="0">
+              <a:schemeClr val="accent1"/>
+            </a:fillRef>
+            <a:effectRef idx="0">
+              <a:schemeClr val="accent1"/>
+            </a:effectRef>
+            <a:fontRef idx="minor">
+              <a:schemeClr val="tx1"/>
+            </a:fontRef>
+          </p:style>
+        </p:cxnSp>
+        <p:cxnSp>
+          <p:nvCxnSpPr>
+            <p:cNvPr id="15" name="Straight Connector 14"/>
+            <p:cNvCxnSpPr/>
+            <p:nvPr/>
+          </p:nvCxnSpPr>
+          <p:spPr>
+            <a:xfrm>
+              <a:off x="3203848" y="836712"/>
+              <a:ext cx="0" cy="432048"/>
+            </a:xfrm>
+            <a:prstGeom prst="line">
+              <a:avLst/>
+            </a:prstGeom>
+            <a:ln>
+              <a:prstDash val="sysDot"/>
+            </a:ln>
+          </p:spPr>
+          <p:style>
+            <a:lnRef idx="1">
+              <a:schemeClr val="accent1"/>
+            </a:lnRef>
+            <a:fillRef idx="0">
+              <a:schemeClr val="accent1"/>
+            </a:fillRef>
+            <a:effectRef idx="0">
+              <a:schemeClr val="accent1"/>
+            </a:effectRef>
+            <a:fontRef idx="minor">
+              <a:schemeClr val="tx1"/>
+            </a:fontRef>
+          </p:style>
+        </p:cxnSp>
+        <p:cxnSp>
+          <p:nvCxnSpPr>
+            <p:cNvPr id="16" name="Straight Connector 15"/>
+            <p:cNvCxnSpPr/>
+            <p:nvPr/>
+          </p:nvCxnSpPr>
+          <p:spPr>
+            <a:xfrm>
+              <a:off x="3995936" y="836712"/>
+              <a:ext cx="0" cy="432048"/>
+            </a:xfrm>
+            <a:prstGeom prst="line">
+              <a:avLst/>
+            </a:prstGeom>
+            <a:ln>
+              <a:prstDash val="sysDot"/>
+            </a:ln>
+          </p:spPr>
+          <p:style>
+            <a:lnRef idx="1">
+              <a:schemeClr val="accent1"/>
+            </a:lnRef>
+            <a:fillRef idx="0">
+              <a:schemeClr val="accent1"/>
+            </a:fillRef>
+            <a:effectRef idx="0">
+              <a:schemeClr val="accent1"/>
+            </a:effectRef>
+            <a:fontRef idx="minor">
+              <a:schemeClr val="tx1"/>
+            </a:fontRef>
+          </p:style>
+        </p:cxnSp>
       </p:grpSp>
-      <p:sp>
-        <p:nvSpPr>
-          <p:cNvPr id="21" name="Rectangle 20"/>
-          <p:cNvSpPr/>
-          <p:nvPr/>
-        </p:nvSpPr>
-        <p:spPr>
-          <a:xfrm>
-            <a:off x="469057" y="262389"/>
-            <a:ext cx="5098256" cy="246221"/>
-          </a:xfrm>
-          <a:prstGeom prst="rect">
-            <a:avLst/>
-          </a:prstGeom>
-        </p:spPr>
-        <p:txBody>
-          <a:bodyPr wrap="square">
-            <a:spAutoFit/>
-          </a:bodyPr>
-          <a:lstStyle/>
-          <a:p>
-            <a:r>
-              <a:rPr lang="en-US" sz="1000" dirty="0">
-                <a:latin typeface="Times New Roman" panose="02020603050405020304" pitchFamily="18" charset="0"/>
-                <a:cs typeface="Times New Roman" panose="02020603050405020304" pitchFamily="18" charset="0"/>
-              </a:rPr>
-              <a:t>The HPX library provides an implementation of </a:t>
-            </a:r>
-            <a:r>
-              <a:rPr lang="en-US" sz="1000" dirty="0" err="1">
-                <a:latin typeface="Times New Roman" panose="02020603050405020304" pitchFamily="18" charset="0"/>
-                <a:cs typeface="Times New Roman" panose="02020603050405020304" pitchFamily="18" charset="0"/>
-              </a:rPr>
-              <a:t>hpx</a:t>
-            </a:r>
-            <a:r>
-              <a:rPr lang="en-US" sz="1000" dirty="0">
-                <a:latin typeface="Times New Roman" panose="02020603050405020304" pitchFamily="18" charset="0"/>
-                <a:cs typeface="Times New Roman" panose="02020603050405020304" pitchFamily="18" charset="0"/>
-              </a:rPr>
-              <a:t>::async that conforms to the </a:t>
-            </a:r>
-            <a:r>
-              <a:rPr lang="en-US" sz="1000" dirty="0" err="1">
-                <a:latin typeface="Times New Roman" panose="02020603050405020304" pitchFamily="18" charset="0"/>
-                <a:cs typeface="Times New Roman" panose="02020603050405020304" pitchFamily="18" charset="0"/>
-              </a:rPr>
-              <a:t>std</a:t>
-            </a:r>
-            <a:r>
-              <a:rPr lang="en-US" sz="1000" dirty="0">
-                <a:latin typeface="Times New Roman" panose="02020603050405020304" pitchFamily="18" charset="0"/>
-                <a:cs typeface="Times New Roman" panose="02020603050405020304" pitchFamily="18" charset="0"/>
-              </a:rPr>
-              <a:t>::async API </a:t>
-            </a:r>
-            <a:endParaRPr lang="en-GB" sz="1000" dirty="0">
-              <a:latin typeface="Times New Roman" panose="02020603050405020304" pitchFamily="18" charset="0"/>
-              <a:cs typeface="Times New Roman" panose="02020603050405020304" pitchFamily="18" charset="0"/>
-            </a:endParaRPr>
-          </a:p>
-        </p:txBody>
-      </p:sp>
     </p:spTree>
     <p:extLst>
       <p:ext uri="{BB962C8B-B14F-4D97-AF65-F5344CB8AC3E}">
@@ -3920,6 +4082,36 @@
           <a:chExt cx="0" cy="0"/>
         </a:xfrm>
       </p:grpSpPr>
+    </p:spTree>
+    <p:extLst>
+      <p:ext uri="{BB962C8B-B14F-4D97-AF65-F5344CB8AC3E}">
+        <p14:creationId xmlns:p14="http://schemas.microsoft.com/office/powerpoint/2010/main" val="477253584"/>
+      </p:ext>
+    </p:extLst>
+  </p:cSld>
+  <p:clrMapOvr>
+    <a:masterClrMapping/>
+  </p:clrMapOvr>
+</p:sld>
+</file>
+
+<file path=ppt/slides/slide4.xml><?xml version="1.0" encoding="utf-8"?>
+<p:sld xmlns:a="http://schemas.openxmlformats.org/drawingml/2006/main" xmlns:r="http://schemas.openxmlformats.org/officeDocument/2006/relationships" xmlns:p="http://schemas.openxmlformats.org/presentationml/2006/main">
+  <p:cSld>
+    <p:spTree>
+      <p:nvGrpSpPr>
+        <p:cNvPr id="1" name=""/>
+        <p:cNvGrpSpPr/>
+        <p:nvPr/>
+      </p:nvGrpSpPr>
+      <p:grpSpPr>
+        <a:xfrm>
+          <a:off x="0" y="0"/>
+          <a:ext cx="0" cy="0"/>
+          <a:chOff x="0" y="0"/>
+          <a:chExt cx="0" cy="0"/>
+        </a:xfrm>
+      </p:grpSpPr>
       <p:sp>
         <p:nvSpPr>
           <p:cNvPr id="26" name="Up-Down Arrow 25"/>
@@ -5799,7 +5991,7 @@
 </p:sld>
 </file>
 
-<file path=ppt/slides/slide4.xml><?xml version="1.0" encoding="utf-8"?>
+<file path=ppt/slides/slide5.xml><?xml version="1.0" encoding="utf-8"?>
 <p:sld xmlns:a="http://schemas.openxmlformats.org/drawingml/2006/main" xmlns:r="http://schemas.openxmlformats.org/officeDocument/2006/relationships" xmlns:p="http://schemas.openxmlformats.org/presentationml/2006/main">
   <p:cSld>
     <p:spTree>
@@ -7142,7 +7334,7 @@
 </p:sld>
 </file>
 
-<file path=ppt/slides/slide5.xml><?xml version="1.0" encoding="utf-8"?>
+<file path=ppt/slides/slide6.xml><?xml version="1.0" encoding="utf-8"?>
 <p:sld xmlns:a="http://schemas.openxmlformats.org/drawingml/2006/main" xmlns:r="http://schemas.openxmlformats.org/officeDocument/2006/relationships" xmlns:p="http://schemas.openxmlformats.org/presentationml/2006/main">
   <p:cSld>
     <p:spTree>
@@ -7212,7 +7404,7 @@
 </p:sld>
 </file>
 
-<file path=ppt/slides/slide6.xml><?xml version="1.0" encoding="utf-8"?>
+<file path=ppt/slides/slide7.xml><?xml version="1.0" encoding="utf-8"?>
 <p:sld xmlns:a="http://schemas.openxmlformats.org/drawingml/2006/main" xmlns:r="http://schemas.openxmlformats.org/officeDocument/2006/relationships" xmlns:p="http://schemas.openxmlformats.org/presentationml/2006/main">
   <p:cSld>
     <p:spTree>
@@ -10056,7 +10248,7 @@
 </p:sld>
 </file>
 
-<file path=ppt/slides/slide7.xml><?xml version="1.0" encoding="utf-8"?>
+<file path=ppt/slides/slide8.xml><?xml version="1.0" encoding="utf-8"?>
 <p:sld xmlns:a="http://schemas.openxmlformats.org/drawingml/2006/main" xmlns:r="http://schemas.openxmlformats.org/officeDocument/2006/relationships" xmlns:p="http://schemas.openxmlformats.org/presentationml/2006/main">
   <p:cSld>
     <p:spTree>
@@ -13383,7 +13575,7 @@
 </p:sld>
 </file>
 
-<file path=ppt/slides/slide8.xml><?xml version="1.0" encoding="utf-8"?>
+<file path=ppt/slides/slide9.xml><?xml version="1.0" encoding="utf-8"?>
 <p:sld xmlns:a="http://schemas.openxmlformats.org/drawingml/2006/main" xmlns:r="http://schemas.openxmlformats.org/officeDocument/2006/relationships" xmlns:p="http://schemas.openxmlformats.org/presentationml/2006/main">
   <p:cSld>
     <p:spTree>

</xml_diff>